<commit_message>
Game Install created, finished powerpoint, refactoring
</commit_message>
<xml_diff>
--- a/Project Starfighter 2.0.pptx
+++ b/Project Starfighter 2.0.pptx
@@ -303,7 +303,7 @@
             <a:fld id="{6CB90BBC-6D72-4417-AC22-48CDFD952405}" type="datetimeFigureOut">
               <a:rPr lang="en-US" smtClean="0"/>
               <a:pPr/>
-              <a:t>4/30/2012</a:t>
+              <a:t>5/1/2012</a:t>
             </a:fld>
             <a:endParaRPr lang="en-US"/>
           </a:p>
@@ -482,7 +482,7 @@
             <a:fld id="{6CB90BBC-6D72-4417-AC22-48CDFD952405}" type="datetimeFigureOut">
               <a:rPr lang="en-US" smtClean="0"/>
               <a:pPr/>
-              <a:t>4/30/2012</a:t>
+              <a:t>5/1/2012</a:t>
             </a:fld>
             <a:endParaRPr lang="en-US"/>
           </a:p>
@@ -671,7 +671,7 @@
             <a:fld id="{6CB90BBC-6D72-4417-AC22-48CDFD952405}" type="datetimeFigureOut">
               <a:rPr lang="en-US" smtClean="0"/>
               <a:pPr/>
-              <a:t>4/30/2012</a:t>
+              <a:t>5/1/2012</a:t>
             </a:fld>
             <a:endParaRPr lang="en-US"/>
           </a:p>
@@ -850,7 +850,7 @@
             <a:fld id="{6CB90BBC-6D72-4417-AC22-48CDFD952405}" type="datetimeFigureOut">
               <a:rPr lang="en-US" smtClean="0"/>
               <a:pPr/>
-              <a:t>4/30/2012</a:t>
+              <a:t>5/1/2012</a:t>
             </a:fld>
             <a:endParaRPr lang="en-US"/>
           </a:p>
@@ -1105,7 +1105,7 @@
             <a:fld id="{6CB90BBC-6D72-4417-AC22-48CDFD952405}" type="datetimeFigureOut">
               <a:rPr lang="en-US" smtClean="0"/>
               <a:pPr/>
-              <a:t>4/30/2012</a:t>
+              <a:t>5/1/2012</a:t>
             </a:fld>
             <a:endParaRPr lang="en-US"/>
           </a:p>
@@ -1402,7 +1402,7 @@
             <a:fld id="{6CB90BBC-6D72-4417-AC22-48CDFD952405}" type="datetimeFigureOut">
               <a:rPr lang="en-US" smtClean="0"/>
               <a:pPr/>
-              <a:t>4/30/2012</a:t>
+              <a:t>5/1/2012</a:t>
             </a:fld>
             <a:endParaRPr lang="en-US"/>
           </a:p>
@@ -1833,7 +1833,7 @@
             <a:fld id="{6CB90BBC-6D72-4417-AC22-48CDFD952405}" type="datetimeFigureOut">
               <a:rPr lang="en-US" smtClean="0"/>
               <a:pPr/>
-              <a:t>4/30/2012</a:t>
+              <a:t>5/1/2012</a:t>
             </a:fld>
             <a:endParaRPr lang="en-US"/>
           </a:p>
@@ -1960,7 +1960,7 @@
             <a:fld id="{6CB90BBC-6D72-4417-AC22-48CDFD952405}" type="datetimeFigureOut">
               <a:rPr lang="en-US" smtClean="0"/>
               <a:pPr/>
-              <a:t>4/30/2012</a:t>
+              <a:t>5/1/2012</a:t>
             </a:fld>
             <a:endParaRPr lang="en-US"/>
           </a:p>
@@ -2064,7 +2064,7 @@
             <a:fld id="{6CB90BBC-6D72-4417-AC22-48CDFD952405}" type="datetimeFigureOut">
               <a:rPr lang="en-US" smtClean="0"/>
               <a:pPr/>
-              <a:t>4/30/2012</a:t>
+              <a:t>5/1/2012</a:t>
             </a:fld>
             <a:endParaRPr lang="en-US"/>
           </a:p>
@@ -2350,7 +2350,7 @@
             <a:fld id="{6CB90BBC-6D72-4417-AC22-48CDFD952405}" type="datetimeFigureOut">
               <a:rPr lang="en-US" smtClean="0"/>
               <a:pPr/>
-              <a:t>4/30/2012</a:t>
+              <a:t>5/1/2012</a:t>
             </a:fld>
             <a:endParaRPr lang="en-US"/>
           </a:p>
@@ -2619,7 +2619,7 @@
             <a:fld id="{6CB90BBC-6D72-4417-AC22-48CDFD952405}" type="datetimeFigureOut">
               <a:rPr lang="en-US" smtClean="0"/>
               <a:pPr/>
-              <a:t>4/30/2012</a:t>
+              <a:t>5/1/2012</a:t>
             </a:fld>
             <a:endParaRPr lang="en-US"/>
           </a:p>
@@ -2870,7 +2870,7 @@
             <a:fld id="{6CB90BBC-6D72-4417-AC22-48CDFD952405}" type="datetimeFigureOut">
               <a:rPr lang="en-US" smtClean="0"/>
               <a:pPr/>
-              <a:t>4/30/2012</a:t>
+              <a:t>5/1/2012</a:t>
             </a:fld>
             <a:endParaRPr lang="en-US"/>
           </a:p>
@@ -3907,15 +3907,7 @@
           <a:p>
             <a:r>
               <a:rPr lang="en-US" dirty="0" smtClean="0"/>
-              <a:t>Enemy </a:t>
-            </a:r>
-            <a:r>
-              <a:rPr lang="en-US" dirty="0" smtClean="0"/>
-              <a:t>2 / Boss </a:t>
-            </a:r>
-            <a:r>
-              <a:rPr lang="en-US" dirty="0" smtClean="0"/>
-              <a:t>Test Code</a:t>
+              <a:t>Enemy 2 / Boss Test Code</a:t>
             </a:r>
             <a:endParaRPr lang="en-US" dirty="0"/>
           </a:p>
@@ -4189,7 +4181,7 @@
     </p:spTree>
     <p:extLst>
       <p:ext uri="{BB962C8B-B14F-4D97-AF65-F5344CB8AC3E}">
-        <p14:creationId xmlns:p14="http://schemas.microsoft.com/office/powerpoint/2010/main" val="2964279014"/>
+        <p14:creationId xmlns:p14="http://schemas.microsoft.com/office/powerpoint/2010/main" xmlns="" val="2964279014"/>
       </p:ext>
     </p:extLst>
   </p:cSld>
@@ -4593,7 +4585,7 @@
     </p:spTree>
     <p:extLst>
       <p:ext uri="{BB962C8B-B14F-4D97-AF65-F5344CB8AC3E}">
-        <p14:creationId xmlns:p14="http://schemas.microsoft.com/office/powerpoint/2010/main" val="1661936536"/>
+        <p14:creationId xmlns:p14="http://schemas.microsoft.com/office/powerpoint/2010/main" xmlns="" val="1661936536"/>
       </p:ext>
     </p:extLst>
   </p:cSld>
@@ -5258,10 +5250,186 @@
           </a:p>
         </p:txBody>
       </p:sp>
+      <p:sp>
+        <p:nvSpPr>
+          <p:cNvPr id="4" name="Rectangle 3"/>
+          <p:cNvSpPr/>
+          <p:nvPr/>
+        </p:nvSpPr>
+        <p:spPr>
+          <a:xfrm>
+            <a:off x="2209800" y="1295400"/>
+            <a:ext cx="5334000" cy="5078313"/>
+          </a:xfrm>
+          <a:prstGeom prst="rect">
+            <a:avLst/>
+          </a:prstGeom>
+        </p:spPr>
+        <p:txBody>
+          <a:bodyPr wrap="square">
+            <a:spAutoFit/>
+          </a:bodyPr>
+          <a:lstStyle/>
+          <a:p>
+            <a:r>
+              <a:rPr lang="en-US" dirty="0" smtClean="0"/>
+              <a:t> [</a:t>
+            </a:r>
+            <a:r>
+              <a:rPr lang="en-US" dirty="0" err="1" smtClean="0"/>
+              <a:t>TestClass</a:t>
+            </a:r>
+            <a:r>
+              <a:rPr lang="en-US" dirty="0" smtClean="0"/>
+              <a:t>]</a:t>
+            </a:r>
+          </a:p>
+          <a:p>
+            <a:r>
+              <a:rPr lang="en-US" dirty="0" smtClean="0"/>
+              <a:t>    public class </a:t>
+            </a:r>
+            <a:r>
+              <a:rPr lang="en-US" dirty="0" err="1" smtClean="0"/>
+              <a:t>VictoryScreen_Test</a:t>
+            </a:r>
+            <a:endParaRPr lang="en-US" dirty="0" smtClean="0"/>
+          </a:p>
+          <a:p>
+            <a:r>
+              <a:rPr lang="en-US" dirty="0" smtClean="0"/>
+              <a:t>    {</a:t>
+            </a:r>
+          </a:p>
+          <a:p>
+            <a:endParaRPr lang="en-US" dirty="0" smtClean="0"/>
+          </a:p>
+          <a:p>
+            <a:r>
+              <a:rPr lang="en-US" dirty="0" smtClean="0"/>
+              <a:t>        [</a:t>
+            </a:r>
+            <a:r>
+              <a:rPr lang="en-US" dirty="0" err="1" smtClean="0"/>
+              <a:t>TestMethod</a:t>
+            </a:r>
+            <a:r>
+              <a:rPr lang="en-US" dirty="0" smtClean="0"/>
+              <a:t>]</a:t>
+            </a:r>
+          </a:p>
+          <a:p>
+            <a:r>
+              <a:rPr lang="en-US" dirty="0" smtClean="0"/>
+              <a:t>        public void </a:t>
+            </a:r>
+            <a:r>
+              <a:rPr lang="en-US" dirty="0" err="1" smtClean="0"/>
+              <a:t>UpdateScore_Test</a:t>
+            </a:r>
+            <a:r>
+              <a:rPr lang="en-US" dirty="0" smtClean="0"/>
+              <a:t>()</a:t>
+            </a:r>
+          </a:p>
+          <a:p>
+            <a:r>
+              <a:rPr lang="en-US" dirty="0" smtClean="0"/>
+              <a:t>        {</a:t>
+            </a:r>
+          </a:p>
+          <a:p>
+            <a:r>
+              <a:rPr lang="en-US" dirty="0" smtClean="0"/>
+              <a:t>            string score;</a:t>
+            </a:r>
+          </a:p>
+          <a:p>
+            <a:r>
+              <a:rPr lang="en-US" dirty="0" smtClean="0"/>
+              <a:t>            </a:t>
+            </a:r>
+            <a:r>
+              <a:rPr lang="en-US" dirty="0" err="1" smtClean="0"/>
+              <a:t>int</a:t>
+            </a:r>
+            <a:r>
+              <a:rPr lang="en-US" dirty="0" smtClean="0"/>
+              <a:t> place = 100;</a:t>
+            </a:r>
+          </a:p>
+          <a:p>
+            <a:r>
+              <a:rPr lang="en-US" dirty="0" smtClean="0"/>
+              <a:t>            score = "Your final score was: ";</a:t>
+            </a:r>
+          </a:p>
+          <a:p>
+            <a:r>
+              <a:rPr lang="en-US" dirty="0" smtClean="0"/>
+              <a:t>            score += </a:t>
+            </a:r>
+            <a:r>
+              <a:rPr lang="en-US" dirty="0" err="1" smtClean="0"/>
+              <a:t>place.ToString</a:t>
+            </a:r>
+            <a:r>
+              <a:rPr lang="en-US" dirty="0" smtClean="0"/>
+              <a:t>();</a:t>
+            </a:r>
+          </a:p>
+          <a:p>
+            <a:endParaRPr lang="en-US" dirty="0" smtClean="0"/>
+          </a:p>
+          <a:p>
+            <a:r>
+              <a:rPr lang="en-US" dirty="0" smtClean="0"/>
+              <a:t>            string expected = "Your final score was: 100";</a:t>
+            </a:r>
+          </a:p>
+          <a:p>
+            <a:endParaRPr lang="en-US" dirty="0" smtClean="0"/>
+          </a:p>
+          <a:p>
+            <a:r>
+              <a:rPr lang="en-US" dirty="0" smtClean="0"/>
+              <a:t>            </a:t>
+            </a:r>
+            <a:r>
+              <a:rPr lang="en-US" dirty="0" err="1" smtClean="0"/>
+              <a:t>Assert.AreEqual</a:t>
+            </a:r>
+            <a:r>
+              <a:rPr lang="en-US" dirty="0" smtClean="0"/>
+              <a:t>(expected, score);</a:t>
+            </a:r>
+          </a:p>
+          <a:p>
+            <a:endParaRPr lang="en-US" dirty="0" smtClean="0"/>
+          </a:p>
+          <a:p>
+            <a:r>
+              <a:rPr lang="en-US" dirty="0" smtClean="0"/>
+              <a:t>        </a:t>
+            </a:r>
+            <a:r>
+              <a:rPr lang="en-US" dirty="0" smtClean="0"/>
+              <a:t>}</a:t>
+            </a:r>
+          </a:p>
+          <a:p>
+            <a:r>
+              <a:rPr lang="en-US" dirty="0" smtClean="0"/>
+              <a:t>     }</a:t>
+            </a:r>
+            <a:endParaRPr lang="en-US" dirty="0" smtClean="0"/>
+          </a:p>
+        </p:txBody>
+      </p:sp>
     </p:spTree>
     <p:extLst>
       <p:ext uri="{BB962C8B-B14F-4D97-AF65-F5344CB8AC3E}">
-        <p14:creationId xmlns:p14="http://schemas.microsoft.com/office/powerpoint/2010/main" val="3772113046"/>
+        <p14:creationId xmlns:p14="http://schemas.microsoft.com/office/powerpoint/2010/main" xmlns="" val="3772113046"/>
       </p:ext>
     </p:extLst>
   </p:cSld>
@@ -5348,10 +5516,179 @@
           </a:p>
         </p:txBody>
       </p:sp>
+      <p:sp>
+        <p:nvSpPr>
+          <p:cNvPr id="4" name="Rectangle 3"/>
+          <p:cNvSpPr/>
+          <p:nvPr/>
+        </p:nvSpPr>
+        <p:spPr>
+          <a:xfrm>
+            <a:off x="2209800" y="1219200"/>
+            <a:ext cx="5410200" cy="4801314"/>
+          </a:xfrm>
+          <a:prstGeom prst="rect">
+            <a:avLst/>
+          </a:prstGeom>
+        </p:spPr>
+        <p:txBody>
+          <a:bodyPr wrap="square">
+            <a:spAutoFit/>
+          </a:bodyPr>
+          <a:lstStyle/>
+          <a:p>
+            <a:r>
+              <a:rPr lang="en-US" dirty="0" smtClean="0"/>
+              <a:t> [</a:t>
+            </a:r>
+            <a:r>
+              <a:rPr lang="en-US" dirty="0" err="1" smtClean="0"/>
+              <a:t>TestClass</a:t>
+            </a:r>
+            <a:r>
+              <a:rPr lang="en-US" dirty="0" smtClean="0"/>
+              <a:t>]</a:t>
+            </a:r>
+          </a:p>
+          <a:p>
+            <a:r>
+              <a:rPr lang="en-US" dirty="0" smtClean="0"/>
+              <a:t>    public class </a:t>
+            </a:r>
+            <a:r>
+              <a:rPr lang="en-US" dirty="0" err="1" smtClean="0"/>
+              <a:t>GameOverScreen_Test</a:t>
+            </a:r>
+            <a:endParaRPr lang="en-US" dirty="0" smtClean="0"/>
+          </a:p>
+          <a:p>
+            <a:r>
+              <a:rPr lang="en-US" dirty="0" smtClean="0"/>
+              <a:t>    {</a:t>
+            </a:r>
+          </a:p>
+          <a:p>
+            <a:r>
+              <a:rPr lang="en-US" dirty="0" smtClean="0"/>
+              <a:t>        [</a:t>
+            </a:r>
+            <a:r>
+              <a:rPr lang="en-US" dirty="0" err="1" smtClean="0"/>
+              <a:t>TestMethod</a:t>
+            </a:r>
+            <a:r>
+              <a:rPr lang="en-US" dirty="0" smtClean="0"/>
+              <a:t>]</a:t>
+            </a:r>
+          </a:p>
+          <a:p>
+            <a:r>
+              <a:rPr lang="en-US" dirty="0" smtClean="0"/>
+              <a:t>        public void </a:t>
+            </a:r>
+            <a:r>
+              <a:rPr lang="en-US" dirty="0" err="1" smtClean="0"/>
+              <a:t>UpdateScore_Test</a:t>
+            </a:r>
+            <a:r>
+              <a:rPr lang="en-US" dirty="0" smtClean="0"/>
+              <a:t>()</a:t>
+            </a:r>
+          </a:p>
+          <a:p>
+            <a:r>
+              <a:rPr lang="en-US" dirty="0" smtClean="0"/>
+              <a:t>        {</a:t>
+            </a:r>
+          </a:p>
+          <a:p>
+            <a:r>
+              <a:rPr lang="en-US" dirty="0" smtClean="0"/>
+              <a:t>            string score;</a:t>
+            </a:r>
+          </a:p>
+          <a:p>
+            <a:r>
+              <a:rPr lang="en-US" dirty="0" smtClean="0"/>
+              <a:t>            </a:t>
+            </a:r>
+            <a:r>
+              <a:rPr lang="en-US" dirty="0" err="1" smtClean="0"/>
+              <a:t>int</a:t>
+            </a:r>
+            <a:r>
+              <a:rPr lang="en-US" dirty="0" smtClean="0"/>
+              <a:t> place = 100;</a:t>
+            </a:r>
+          </a:p>
+          <a:p>
+            <a:r>
+              <a:rPr lang="en-US" dirty="0" smtClean="0"/>
+              <a:t>            score = "Your final score was: ";</a:t>
+            </a:r>
+          </a:p>
+          <a:p>
+            <a:r>
+              <a:rPr lang="en-US" dirty="0" smtClean="0"/>
+              <a:t>            score += </a:t>
+            </a:r>
+            <a:r>
+              <a:rPr lang="en-US" dirty="0" err="1" smtClean="0"/>
+              <a:t>place.ToString</a:t>
+            </a:r>
+            <a:r>
+              <a:rPr lang="en-US" dirty="0" smtClean="0"/>
+              <a:t>();</a:t>
+            </a:r>
+          </a:p>
+          <a:p>
+            <a:endParaRPr lang="en-US" dirty="0" smtClean="0"/>
+          </a:p>
+          <a:p>
+            <a:r>
+              <a:rPr lang="en-US" dirty="0" smtClean="0"/>
+              <a:t>            string expected = "Your final score was: 100";</a:t>
+            </a:r>
+          </a:p>
+          <a:p>
+            <a:endParaRPr lang="en-US" dirty="0" smtClean="0"/>
+          </a:p>
+          <a:p>
+            <a:r>
+              <a:rPr lang="en-US" dirty="0" smtClean="0"/>
+              <a:t>            </a:t>
+            </a:r>
+            <a:r>
+              <a:rPr lang="en-US" dirty="0" err="1" smtClean="0"/>
+              <a:t>Assert.AreEqual</a:t>
+            </a:r>
+            <a:r>
+              <a:rPr lang="en-US" dirty="0" smtClean="0"/>
+              <a:t>(expected, score);</a:t>
+            </a:r>
+          </a:p>
+          <a:p>
+            <a:endParaRPr lang="en-US" dirty="0" smtClean="0"/>
+          </a:p>
+          <a:p>
+            <a:r>
+              <a:rPr lang="en-US" dirty="0" smtClean="0"/>
+              <a:t>        }</a:t>
+            </a:r>
+          </a:p>
+          <a:p>
+            <a:r>
+              <a:rPr lang="en-US" dirty="0" smtClean="0"/>
+              <a:t>    }</a:t>
+            </a:r>
+            <a:endParaRPr lang="en-US" dirty="0"/>
+          </a:p>
+        </p:txBody>
+      </p:sp>
     </p:spTree>
     <p:extLst>
       <p:ext uri="{BB962C8B-B14F-4D97-AF65-F5344CB8AC3E}">
-        <p14:creationId xmlns:p14="http://schemas.microsoft.com/office/powerpoint/2010/main" val="755878279"/>
+        <p14:creationId xmlns:p14="http://schemas.microsoft.com/office/powerpoint/2010/main" xmlns="" val="755878279"/>
       </p:ext>
     </p:extLst>
   </p:cSld>

</xml_diff>